<commit_message>
Update for Summer 2024.
</commit_message>
<xml_diff>
--- a/slides/MiCM Workshop - Intro to Python (Part 1).pptx
+++ b/slides/MiCM Workshop - Intro to Python (Part 1).pptx
@@ -5457,7 +5457,7 @@
           <a:p>
             <a:fld id="{217E5156-1B5D-054E-B5B2-E1B1BA160252}" type="datetimeFigureOut">
               <a:rPr lang="fr-FR" smtClean="0"/>
-              <a:t>16/02/2024</a:t>
+              <a:t>11/07/2024</a:t>
             </a:fld>
             <a:endParaRPr lang="fr-FR"/>
           </a:p>
@@ -8314,7 +8314,7 @@
               <a:rPr lang="en-CA" sz="1800" dirty="0">
                 <a:latin typeface="Helvetica Light"/>
               </a:rPr>
-              <a:t>Workshop Lead: Benjamin Rudski</a:t>
+              <a:t>Workshop Lead: Benjamin Z. Rudski</a:t>
             </a:r>
             <a:endParaRPr lang="en-CA" dirty="0">
               <a:latin typeface="Helvetica Light"/>
@@ -8354,7 +8354,7 @@
               <a:rPr lang="en-CA" sz="1800" dirty="0">
                 <a:latin typeface="Helvetica Light"/>
               </a:rPr>
-              <a:t>Date: February 20, 2024</a:t>
+              <a:t>Date: July 16, 2024</a:t>
             </a:r>
             <a:endParaRPr lang="en-CA" sz="1800" dirty="0">
               <a:latin typeface="Helvetica Light" panose="020B0403020202020204" pitchFamily="34" charset="0"/>
@@ -12482,7 +12482,7 @@
       </p:pic>
       <p:pic>
         <p:nvPicPr>
-          <p:cNvPr id="5" name="Picture 4" descr="A qr code with black squares&#10;&#10;Description automatically generated">
+          <p:cNvPr id="5" name="Picture 4">
             <a:extLst>
               <a:ext uri="{FF2B5EF4-FFF2-40B4-BE49-F238E27FC236}">
                 <a16:creationId xmlns:a16="http://schemas.microsoft.com/office/drawing/2014/main" id="{ED21FF63-C3A3-5474-C983-875579D1C471}"/>
@@ -12496,9 +12496,8 @@
         </p:nvPicPr>
         <p:blipFill>
           <a:blip r:embed="rId5"/>
-          <a:stretch>
-            <a:fillRect/>
-          </a:stretch>
+          <a:srcRect/>
+          <a:stretch/>
         </p:blipFill>
         <p:spPr>
           <a:xfrm>
@@ -12903,7 +12902,7 @@
       </p:sp>
       <p:pic>
         <p:nvPicPr>
-          <p:cNvPr id="4" name="Picture 3" descr="A screenshot of a computer&#10;&#10;Description automatically generated">
+          <p:cNvPr id="4" name="Picture 3">
             <a:extLst>
               <a:ext uri="{FF2B5EF4-FFF2-40B4-BE49-F238E27FC236}">
                 <a16:creationId xmlns:a16="http://schemas.microsoft.com/office/drawing/2014/main" id="{B73F19DF-CC62-7C0C-6BE5-5E0FDD57F9E4}"/>
@@ -12917,14 +12916,13 @@
         </p:nvPicPr>
         <p:blipFill>
           <a:blip r:embed="rId3"/>
-          <a:stretch>
-            <a:fillRect/>
-          </a:stretch>
+          <a:srcRect/>
+          <a:stretch/>
         </p:blipFill>
         <p:spPr>
           <a:xfrm>
-            <a:off x="1035832" y="1950154"/>
-            <a:ext cx="7421011" cy="4182059"/>
+            <a:off x="1918398" y="1950154"/>
+            <a:ext cx="5655879" cy="4182059"/>
           </a:xfrm>
           <a:prstGeom prst="rect">
             <a:avLst/>
@@ -12945,7 +12943,7 @@
         </p:nvSpPr>
         <p:spPr>
           <a:xfrm>
-            <a:off x="1674691" y="1303823"/>
+            <a:off x="1322773" y="1303823"/>
             <a:ext cx="6498455" cy="646331"/>
           </a:xfrm>
           <a:prstGeom prst="rect">
@@ -12961,7 +12959,7 @@
           <a:p>
             <a:r>
               <a:rPr lang="en-CA" sz="3600" b="1" dirty="0"/>
-              <a:t>Winter 2024 Workshop Series</a:t>
+              <a:t>Summer 2024 Workshop Series</a:t>
             </a:r>
           </a:p>
         </p:txBody>
@@ -13066,7 +13064,7 @@
           <a:p>
             <a:r>
               <a:rPr lang="en-US" dirty="0"/>
-              <a:t>Third-year PhD student in Quantitative Life Sciences (QLS)</a:t>
+              <a:t>Third-year PhD candidate in Quantitative Life Sciences (QLS)</a:t>
             </a:r>
           </a:p>
           <a:p>

</xml_diff>